<commit_message>
Fixed taxrate and modified some slides
</commit_message>
<xml_diff>
--- a/comp433p2p3/COMP433FinalPPT.pptx
+++ b/comp433p2p3/COMP433FinalPPT.pptx
@@ -7,10 +7,10 @@
     <p:sldMasterId id="2147483669" r:id="rId3"/>
   </p:sldMasterIdLst>
   <p:notesMasterIdLst>
-    <p:notesMasterId r:id="rId22"/>
+    <p:notesMasterId r:id="rId23"/>
   </p:notesMasterIdLst>
   <p:handoutMasterIdLst>
-    <p:handoutMasterId r:id="rId23"/>
+    <p:handoutMasterId r:id="rId24"/>
   </p:handoutMasterIdLst>
   <p:sldIdLst>
     <p:sldId id="466" r:id="rId4"/>
@@ -22,15 +22,16 @@
     <p:sldId id="526" r:id="rId10"/>
     <p:sldId id="544" r:id="rId11"/>
     <p:sldId id="529" r:id="rId12"/>
-    <p:sldId id="528" r:id="rId13"/>
-    <p:sldId id="531" r:id="rId14"/>
-    <p:sldId id="535" r:id="rId15"/>
-    <p:sldId id="536" r:id="rId16"/>
-    <p:sldId id="537" r:id="rId17"/>
-    <p:sldId id="538" r:id="rId18"/>
-    <p:sldId id="539" r:id="rId19"/>
-    <p:sldId id="541" r:id="rId20"/>
-    <p:sldId id="543" r:id="rId21"/>
+    <p:sldId id="546" r:id="rId13"/>
+    <p:sldId id="528" r:id="rId14"/>
+    <p:sldId id="531" r:id="rId15"/>
+    <p:sldId id="535" r:id="rId16"/>
+    <p:sldId id="536" r:id="rId17"/>
+    <p:sldId id="537" r:id="rId18"/>
+    <p:sldId id="538" r:id="rId19"/>
+    <p:sldId id="539" r:id="rId20"/>
+    <p:sldId id="541" r:id="rId21"/>
+    <p:sldId id="543" r:id="rId22"/>
   </p:sldIdLst>
   <p:sldSz cx="9144000" cy="6858000" type="screen4x3"/>
   <p:notesSz cx="7010400" cy="9236075"/>
@@ -176,7 +177,7 @@
   </p:defaultTextStyle>
   <p:extLst>
     <p:ext uri="{EFAFB233-063F-42B5-8137-9DF3F51BA10A}">
-      <p15:sldGuideLst xmlns:p15="http://schemas.microsoft.com/office/powerpoint/2012/main" xmlns="">
+      <p15:sldGuideLst xmlns:p15="http://schemas.microsoft.com/office/powerpoint/2012/main">
         <p15:guide id="1" orient="horz" pos="2160">
           <p15:clr>
             <a:srgbClr val="A4A3A4"/>
@@ -190,7 +191,7 @@
       </p15:sldGuideLst>
     </p:ext>
     <p:ext uri="{2D200454-40CA-4A62-9FC3-DE9A4176ACB9}">
-      <p15:notesGuideLst xmlns:p15="http://schemas.microsoft.com/office/powerpoint/2012/main" xmlns="">
+      <p15:notesGuideLst xmlns:p15="http://schemas.microsoft.com/office/powerpoint/2012/main">
         <p15:guide id="1" orient="horz" pos="2910">
           <p15:clr>
             <a:srgbClr val="A4A3A4"/>
@@ -9292,10 +9293,6 @@
               <a:rPr lang="en-US" altLang="zh-CN" sz="4000" dirty="0"/>
               <a:t>Web services programming</a:t>
             </a:r>
-            <a:r>
-              <a:rPr lang="en-US" sz="4000" dirty="0"/>
-              <a:t/>
-            </a:r>
             <a:br>
               <a:rPr lang="en-US" sz="4000" dirty="0"/>
             </a:br>
@@ -9428,7 +9425,7 @@
 </file>
 
 <file path=ppt/slides/slide10.xml><?xml version="1.0" encoding="utf-8"?>
-<p:sld xmlns:a="http://schemas.openxmlformats.org/drawingml/2006/main" xmlns:r="http://schemas.openxmlformats.org/officeDocument/2006/relationships" xmlns:p="http://schemas.openxmlformats.org/presentationml/2006/main" showMasterPhAnim="0">
+<p:sld xmlns:a="http://schemas.openxmlformats.org/drawingml/2006/main" xmlns:r="http://schemas.openxmlformats.org/officeDocument/2006/relationships" xmlns:p="http://schemas.openxmlformats.org/presentationml/2006/main">
   <p:cSld>
     <p:spTree>
       <p:nvGrpSpPr>
@@ -9446,24 +9443,50 @@
       </p:grpSpPr>
       <p:sp>
         <p:nvSpPr>
-          <p:cNvPr id="5122" name="Slide Number Placeholder 3"/>
+          <p:cNvPr id="2" name="Title 1"/>
           <p:cNvSpPr>
             <a:spLocks noGrp="1"/>
           </p:cNvSpPr>
           <p:nvPr>
-            <p:ph type="sldNum" sz="quarter" idx="10"/>
-          </p:nvPr>
-        </p:nvSpPr>
-        <p:spPr>
-          <a:noFill/>
-        </p:spPr>
+            <p:ph type="title"/>
+          </p:nvPr>
+        </p:nvSpPr>
+        <p:spPr/>
         <p:txBody>
           <a:bodyPr/>
           <a:lstStyle/>
           <a:p>
-            <a:fld id="{338DB9B1-C646-48CE-AFA6-93572B519D26}" type="slidenum">
+            <a:r>
+              <a:rPr lang="en-US" sz="3600" dirty="0"/>
+              <a:t>Project Architecture</a:t>
+            </a:r>
+            <a:endParaRPr lang="en-US" sz="3600" dirty="0"/>
+          </a:p>
+        </p:txBody>
+      </p:sp>
+      <p:sp>
+        <p:nvSpPr>
+          <p:cNvPr id="4" name="Slide Number Placeholder 3"/>
+          <p:cNvSpPr>
+            <a:spLocks noGrp="1"/>
+          </p:cNvSpPr>
+          <p:nvPr>
+            <p:ph type="sldNum" sz="quarter" idx="10"/>
+          </p:nvPr>
+        </p:nvSpPr>
+        <p:spPr/>
+        <p:txBody>
+          <a:bodyPr/>
+          <a:lstStyle/>
+          <a:p>
+            <a:pPr>
+              <a:defRPr/>
+            </a:pPr>
+            <a:fld id="{C09B9D2E-8DA2-4A45-82A9-24FA37AAA5DD}" type="slidenum">
               <a:rPr lang="en-US" smtClean="0"/>
-              <a:pPr/>
+              <a:pPr>
+                <a:defRPr/>
+              </a:pPr>
               <a:t>10</a:t>
             </a:fld>
             <a:endParaRPr lang="en-US" dirty="0"/>
@@ -9472,38 +9495,59 @@
       </p:sp>
       <p:sp>
         <p:nvSpPr>
-          <p:cNvPr id="2633730" name="Rectangle 2"/>
-          <p:cNvSpPr>
-            <a:spLocks noGrp="1" noChangeArrowheads="1"/>
-          </p:cNvSpPr>
-          <p:nvPr>
-            <p:ph type="title"/>
-          </p:nvPr>
+          <p:cNvPr id="6" name="TextBox 5"/>
+          <p:cNvSpPr txBox="1"/>
+          <p:nvPr/>
         </p:nvSpPr>
         <p:spPr>
           <a:xfrm>
-            <a:off x="457200" y="250254"/>
-            <a:ext cx="5943600" cy="1173162"/>
+            <a:off x="3743325" y="6248400"/>
+            <a:ext cx="1208985" cy="338554"/>
           </a:xfrm>
-        </p:spPr>
-        <p:txBody>
-          <a:bodyPr/>
+          <a:prstGeom prst="rect">
+            <a:avLst/>
+          </a:prstGeom>
+          <a:noFill/>
+        </p:spPr>
+        <p:txBody>
+          <a:bodyPr wrap="none" rtlCol="0">
+            <a:spAutoFit/>
+          </a:bodyPr>
           <a:lstStyle/>
           <a:p>
             <a:r>
-              <a:rPr lang="en-US" sz="3600" dirty="0"/>
-              <a:t>Project Architecture </a:t>
-            </a:r>
+              <a:rPr lang="en-US" altLang="zh-CN" dirty="0">
+                <a:solidFill>
+                  <a:schemeClr val="tx1"/>
+                </a:solidFill>
+              </a:rPr>
+              <a:t>Sample </a:t>
+            </a:r>
+            <a:r>
+              <a:rPr lang="en-US" altLang="zh-CN" dirty="0" err="1">
+                <a:solidFill>
+                  <a:schemeClr val="tx1"/>
+                </a:solidFill>
+              </a:rPr>
+              <a:t>ddl</a:t>
+            </a:r>
+            <a:endParaRPr lang="en-US" dirty="0">
+              <a:solidFill>
+                <a:schemeClr val="tx1"/>
+              </a:solidFill>
+            </a:endParaRPr>
           </a:p>
         </p:txBody>
       </p:sp>
       <p:pic>
         <p:nvPicPr>
-          <p:cNvPr id="2" name="Picture 1"/>
+          <p:cNvPr id="8" name="Content Placeholder 7"/>
           <p:cNvPicPr>
-            <a:picLocks noChangeAspect="1"/>
+            <a:picLocks noGrp="1" noChangeAspect="1"/>
           </p:cNvPicPr>
-          <p:nvPr/>
+          <p:nvPr>
+            <p:ph idx="1"/>
+          </p:nvPr>
         </p:nvPicPr>
         <p:blipFill>
           <a:blip r:embed="rId2"/>
@@ -9513,8 +9557,8 @@
         </p:blipFill>
         <p:spPr>
           <a:xfrm>
-            <a:off x="1538861" y="2114549"/>
-            <a:ext cx="5833489" cy="3576183"/>
+            <a:off x="1762021" y="1600200"/>
+            <a:ext cx="5619957" cy="4525963"/>
           </a:xfrm>
           <a:prstGeom prst="rect">
             <a:avLst/>
@@ -9524,7 +9568,7 @@
     </p:spTree>
     <p:extLst>
       <p:ext uri="{BB962C8B-B14F-4D97-AF65-F5344CB8AC3E}">
-        <p14:creationId xmlns:p14="http://schemas.microsoft.com/office/powerpoint/2010/main" val="2806120052"/>
+        <p14:creationId xmlns:p14="http://schemas.microsoft.com/office/powerpoint/2010/main" val="3267917559"/>
       </p:ext>
     </p:extLst>
   </p:cSld>
@@ -9589,6 +9633,113 @@
         </p:nvSpPr>
         <p:spPr>
           <a:xfrm>
+            <a:off x="457200" y="250254"/>
+            <a:ext cx="5943600" cy="1173162"/>
+          </a:xfrm>
+        </p:spPr>
+        <p:txBody>
+          <a:bodyPr/>
+          <a:lstStyle/>
+          <a:p>
+            <a:r>
+              <a:rPr lang="en-US" sz="3600" dirty="0"/>
+              <a:t>Project Architecture </a:t>
+            </a:r>
+          </a:p>
+        </p:txBody>
+      </p:sp>
+      <p:pic>
+        <p:nvPicPr>
+          <p:cNvPr id="2" name="Picture 1"/>
+          <p:cNvPicPr>
+            <a:picLocks noChangeAspect="1"/>
+          </p:cNvPicPr>
+          <p:nvPr/>
+        </p:nvPicPr>
+        <p:blipFill>
+          <a:blip r:embed="rId2"/>
+          <a:stretch>
+            <a:fillRect/>
+          </a:stretch>
+        </p:blipFill>
+        <p:spPr>
+          <a:xfrm>
+            <a:off x="1538861" y="2114549"/>
+            <a:ext cx="5833489" cy="3576183"/>
+          </a:xfrm>
+          <a:prstGeom prst="rect">
+            <a:avLst/>
+          </a:prstGeom>
+        </p:spPr>
+      </p:pic>
+    </p:spTree>
+    <p:extLst>
+      <p:ext uri="{BB962C8B-B14F-4D97-AF65-F5344CB8AC3E}">
+        <p14:creationId xmlns:p14="http://schemas.microsoft.com/office/powerpoint/2010/main" val="2806120052"/>
+      </p:ext>
+    </p:extLst>
+  </p:cSld>
+  <p:clrMapOvr>
+    <a:masterClrMapping/>
+  </p:clrMapOvr>
+</p:sld>
+</file>
+
+<file path=ppt/slides/slide12.xml><?xml version="1.0" encoding="utf-8"?>
+<p:sld xmlns:a="http://schemas.openxmlformats.org/drawingml/2006/main" xmlns:r="http://schemas.openxmlformats.org/officeDocument/2006/relationships" xmlns:p="http://schemas.openxmlformats.org/presentationml/2006/main" showMasterPhAnim="0">
+  <p:cSld>
+    <p:spTree>
+      <p:nvGrpSpPr>
+        <p:cNvPr id="1" name=""/>
+        <p:cNvGrpSpPr/>
+        <p:nvPr/>
+      </p:nvGrpSpPr>
+      <p:grpSpPr>
+        <a:xfrm>
+          <a:off x="0" y="0"/>
+          <a:ext cx="0" cy="0"/>
+          <a:chOff x="0" y="0"/>
+          <a:chExt cx="0" cy="0"/>
+        </a:xfrm>
+      </p:grpSpPr>
+      <p:sp>
+        <p:nvSpPr>
+          <p:cNvPr id="5122" name="Slide Number Placeholder 3"/>
+          <p:cNvSpPr>
+            <a:spLocks noGrp="1"/>
+          </p:cNvSpPr>
+          <p:nvPr>
+            <p:ph type="sldNum" sz="quarter" idx="10"/>
+          </p:nvPr>
+        </p:nvSpPr>
+        <p:spPr>
+          <a:noFill/>
+        </p:spPr>
+        <p:txBody>
+          <a:bodyPr/>
+          <a:lstStyle/>
+          <a:p>
+            <a:fld id="{338DB9B1-C646-48CE-AFA6-93572B519D26}" type="slidenum">
+              <a:rPr lang="en-US" smtClean="0"/>
+              <a:pPr/>
+              <a:t>12</a:t>
+            </a:fld>
+            <a:endParaRPr lang="en-US" dirty="0"/>
+          </a:p>
+        </p:txBody>
+      </p:sp>
+      <p:sp>
+        <p:nvSpPr>
+          <p:cNvPr id="2633730" name="Rectangle 2"/>
+          <p:cNvSpPr>
+            <a:spLocks noGrp="1" noChangeArrowheads="1"/>
+          </p:cNvSpPr>
+          <p:nvPr>
+            <p:ph type="title"/>
+          </p:nvPr>
+        </p:nvSpPr>
+        <p:spPr>
+          <a:xfrm>
             <a:off x="42672" y="250254"/>
             <a:ext cx="6772656" cy="1173162"/>
           </a:xfrm>
@@ -9689,7 +9840,7 @@
   <p:timing>
     <p:tnLst>
       <p:par>
-        <p:cTn xmlns:p14="http://schemas.microsoft.com/office/powerpoint/2010/main" id="1" dur="indefinite" restart="never" nodeType="tmRoot">
+        <p:cTn id="1" dur="indefinite" restart="never" nodeType="tmRoot">
           <p:childTnLst>
             <p:seq concurrent="1" nextAc="seek">
               <p:cTn id="2" dur="indefinite" nodeType="mainSeq">
@@ -9841,7 +9992,7 @@
 </p:sld>
 </file>
 
-<file path=ppt/slides/slide12.xml><?xml version="1.0" encoding="utf-8"?>
+<file path=ppt/slides/slide13.xml><?xml version="1.0" encoding="utf-8"?>
 <p:sld xmlns:a="http://schemas.openxmlformats.org/drawingml/2006/main" xmlns:r="http://schemas.openxmlformats.org/officeDocument/2006/relationships" xmlns:p="http://schemas.openxmlformats.org/presentationml/2006/main">
   <p:cSld>
     <p:spTree>
@@ -9902,7 +10053,7 @@
           <a:p>
             <a:r>
               <a:rPr lang="en-US" dirty="0"/>
-              <a:t>JDBC to connect database</a:t>
+              <a:t>Use JDBC to access database</a:t>
             </a:r>
           </a:p>
           <a:p>
@@ -9933,7 +10084,7 @@
               <a:pPr>
                 <a:defRPr/>
               </a:pPr>
-              <a:t>12</a:t>
+              <a:t>13</a:t>
             </a:fld>
             <a:endParaRPr lang="en-US"/>
           </a:p>
@@ -9967,175 +10118,6 @@
     <p:extLst>
       <p:ext uri="{BB962C8B-B14F-4D97-AF65-F5344CB8AC3E}">
         <p14:creationId xmlns:p14="http://schemas.microsoft.com/office/powerpoint/2010/main" val="3606323745"/>
-      </p:ext>
-    </p:extLst>
-  </p:cSld>
-  <p:clrMapOvr>
-    <a:masterClrMapping/>
-  </p:clrMapOvr>
-</p:sld>
-</file>
-
-<file path=ppt/slides/slide13.xml><?xml version="1.0" encoding="utf-8"?>
-<p:sld xmlns:a="http://schemas.openxmlformats.org/drawingml/2006/main" xmlns:r="http://schemas.openxmlformats.org/officeDocument/2006/relationships" xmlns:p="http://schemas.openxmlformats.org/presentationml/2006/main">
-  <p:cSld>
-    <p:spTree>
-      <p:nvGrpSpPr>
-        <p:cNvPr id="1" name=""/>
-        <p:cNvGrpSpPr/>
-        <p:nvPr/>
-      </p:nvGrpSpPr>
-      <p:grpSpPr>
-        <a:xfrm>
-          <a:off x="0" y="0"/>
-          <a:ext cx="0" cy="0"/>
-          <a:chOff x="0" y="0"/>
-          <a:chExt cx="0" cy="0"/>
-        </a:xfrm>
-      </p:grpSpPr>
-      <p:sp>
-        <p:nvSpPr>
-          <p:cNvPr id="2" name="Title 1"/>
-          <p:cNvSpPr>
-            <a:spLocks noGrp="1"/>
-          </p:cNvSpPr>
-          <p:nvPr>
-            <p:ph type="title"/>
-          </p:nvPr>
-        </p:nvSpPr>
-        <p:spPr/>
-        <p:txBody>
-          <a:bodyPr/>
-          <a:lstStyle/>
-          <a:p>
-            <a:r>
-              <a:rPr lang="en-US" sz="3600" dirty="0"/>
-              <a:t>Implementation</a:t>
-            </a:r>
-          </a:p>
-        </p:txBody>
-      </p:sp>
-      <p:sp>
-        <p:nvSpPr>
-          <p:cNvPr id="3" name="Content Placeholder 2"/>
-          <p:cNvSpPr>
-            <a:spLocks noGrp="1"/>
-          </p:cNvSpPr>
-          <p:nvPr>
-            <p:ph idx="1"/>
-          </p:nvPr>
-        </p:nvSpPr>
-        <p:spPr>
-          <a:xfrm>
-            <a:off x="457200" y="1600200"/>
-            <a:ext cx="8229600" cy="657225"/>
-          </a:xfrm>
-        </p:spPr>
-        <p:txBody>
-          <a:bodyPr/>
-          <a:lstStyle/>
-          <a:p>
-            <a:r>
-              <a:rPr lang="en-US" dirty="0"/>
-              <a:t>Follow </a:t>
-            </a:r>
-            <a:r>
-              <a:rPr lang="en-US" dirty="0" err="1"/>
-              <a:t>ReST</a:t>
-            </a:r>
-            <a:r>
-              <a:rPr lang="en-US" dirty="0"/>
-              <a:t> design principles to CRUD</a:t>
-            </a:r>
-          </a:p>
-        </p:txBody>
-      </p:sp>
-      <p:sp>
-        <p:nvSpPr>
-          <p:cNvPr id="4" name="Slide Number Placeholder 3"/>
-          <p:cNvSpPr>
-            <a:spLocks noGrp="1"/>
-          </p:cNvSpPr>
-          <p:nvPr>
-            <p:ph type="sldNum" sz="quarter" idx="10"/>
-          </p:nvPr>
-        </p:nvSpPr>
-        <p:spPr/>
-        <p:txBody>
-          <a:bodyPr/>
-          <a:lstStyle/>
-          <a:p>
-            <a:pPr>
-              <a:defRPr/>
-            </a:pPr>
-            <a:fld id="{C09B9D2E-8DA2-4A45-82A9-24FA37AAA5DD}" type="slidenum">
-              <a:rPr lang="en-US" smtClean="0"/>
-              <a:pPr>
-                <a:defRPr/>
-              </a:pPr>
-              <a:t>13</a:t>
-            </a:fld>
-            <a:endParaRPr lang="en-US"/>
-          </a:p>
-        </p:txBody>
-      </p:sp>
-      <p:pic>
-        <p:nvPicPr>
-          <p:cNvPr id="5" name="Picture 4"/>
-          <p:cNvPicPr>
-            <a:picLocks noChangeAspect="1"/>
-          </p:cNvPicPr>
-          <p:nvPr/>
-        </p:nvPicPr>
-        <p:blipFill>
-          <a:blip r:embed="rId2"/>
-          <a:stretch>
-            <a:fillRect/>
-          </a:stretch>
-        </p:blipFill>
-        <p:spPr>
-          <a:xfrm>
-            <a:off x="1633537" y="3271837"/>
-            <a:ext cx="6219825" cy="1962150"/>
-          </a:xfrm>
-          <a:prstGeom prst="rect">
-            <a:avLst/>
-          </a:prstGeom>
-        </p:spPr>
-      </p:pic>
-      <p:sp>
-        <p:nvSpPr>
-          <p:cNvPr id="6" name="TextBox 5"/>
-          <p:cNvSpPr txBox="1"/>
-          <p:nvPr/>
-        </p:nvSpPr>
-        <p:spPr>
-          <a:xfrm>
-            <a:off x="657225" y="2409825"/>
-            <a:ext cx="2829108" cy="338554"/>
-          </a:xfrm>
-          <a:prstGeom prst="rect">
-            <a:avLst/>
-          </a:prstGeom>
-          <a:noFill/>
-        </p:spPr>
-        <p:txBody>
-          <a:bodyPr wrap="none" rtlCol="0">
-            <a:spAutoFit/>
-          </a:bodyPr>
-          <a:lstStyle/>
-          <a:p>
-            <a:r>
-              <a:rPr lang="en-US" dirty="0"/>
-              <a:t>Example of the GET method:</a:t>
-            </a:r>
-          </a:p>
-        </p:txBody>
-      </p:sp>
-    </p:spTree>
-    <p:extLst>
-      <p:ext uri="{BB962C8B-B14F-4D97-AF65-F5344CB8AC3E}">
-        <p14:creationId xmlns:p14="http://schemas.microsoft.com/office/powerpoint/2010/main" val="1418166819"/>
       </p:ext>
     </p:extLst>
   </p:cSld>
@@ -10196,20 +10178,25 @@
         </p:nvSpPr>
         <p:spPr>
           <a:xfrm>
-            <a:off x="2735913" y="6438900"/>
-            <a:ext cx="3476626" cy="333375"/>
+            <a:off x="457200" y="1600200"/>
+            <a:ext cx="8229600" cy="657225"/>
           </a:xfrm>
         </p:spPr>
         <p:txBody>
           <a:bodyPr/>
           <a:lstStyle/>
           <a:p>
-            <a:pPr marL="0" indent="0">
-              <a:buNone/>
-            </a:pPr>
-            <a:r>
-              <a:rPr lang="en-US" sz="1400" dirty="0"/>
-              <a:t>Screenshot from postman of get method</a:t>
+            <a:r>
+              <a:rPr lang="en-US" dirty="0"/>
+              <a:t>Follow </a:t>
+            </a:r>
+            <a:r>
+              <a:rPr lang="en-US" dirty="0" err="1"/>
+              <a:t>ReST</a:t>
+            </a:r>
+            <a:r>
+              <a:rPr lang="en-US" dirty="0"/>
+              <a:t> design principles to CRUD</a:t>
             </a:r>
           </a:p>
         </p:txBody>
@@ -10245,7 +10232,7 @@
       </p:sp>
       <p:pic>
         <p:nvPicPr>
-          <p:cNvPr id="6" name="Picture 5"/>
+          <p:cNvPr id="5" name="Picture 4"/>
           <p:cNvPicPr>
             <a:picLocks noChangeAspect="1"/>
           </p:cNvPicPr>
@@ -10259,18 +10246,71 @@
         </p:blipFill>
         <p:spPr>
           <a:xfrm>
-            <a:off x="1495425" y="1704976"/>
-            <a:ext cx="5957603" cy="4543424"/>
+            <a:off x="1052512" y="2900779"/>
+            <a:ext cx="6082635" cy="1918871"/>
           </a:xfrm>
           <a:prstGeom prst="rect">
             <a:avLst/>
           </a:prstGeom>
         </p:spPr>
       </p:pic>
+      <p:sp>
+        <p:nvSpPr>
+          <p:cNvPr id="6" name="TextBox 5"/>
+          <p:cNvSpPr txBox="1"/>
+          <p:nvPr/>
+        </p:nvSpPr>
+        <p:spPr>
+          <a:xfrm>
+            <a:off x="657225" y="2409825"/>
+            <a:ext cx="2829108" cy="338554"/>
+          </a:xfrm>
+          <a:prstGeom prst="rect">
+            <a:avLst/>
+          </a:prstGeom>
+          <a:noFill/>
+        </p:spPr>
+        <p:txBody>
+          <a:bodyPr wrap="none" rtlCol="0">
+            <a:spAutoFit/>
+          </a:bodyPr>
+          <a:lstStyle/>
+          <a:p>
+            <a:r>
+              <a:rPr lang="en-US" dirty="0"/>
+              <a:t>Example of the GET method:</a:t>
+            </a:r>
+          </a:p>
+        </p:txBody>
+      </p:sp>
+      <p:pic>
+        <p:nvPicPr>
+          <p:cNvPr id="7" name="Picture 6"/>
+          <p:cNvPicPr>
+            <a:picLocks noChangeAspect="1"/>
+          </p:cNvPicPr>
+          <p:nvPr/>
+        </p:nvPicPr>
+        <p:blipFill>
+          <a:blip r:embed="rId3"/>
+          <a:stretch>
+            <a:fillRect/>
+          </a:stretch>
+        </p:blipFill>
+        <p:spPr>
+          <a:xfrm>
+            <a:off x="1052512" y="4972050"/>
+            <a:ext cx="5857875" cy="1447800"/>
+          </a:xfrm>
+          <a:prstGeom prst="rect">
+            <a:avLst/>
+          </a:prstGeom>
+        </p:spPr>
+      </p:pic>
     </p:spTree>
     <p:extLst>
       <p:ext uri="{BB962C8B-B14F-4D97-AF65-F5344CB8AC3E}">
-        <p14:creationId xmlns:p14="http://schemas.microsoft.com/office/powerpoint/2010/main" val="1541514851"/>
+        <p14:creationId xmlns:p14="http://schemas.microsoft.com/office/powerpoint/2010/main" val="1418166819"/>
       </p:ext>
     </p:extLst>
   </p:cSld>
@@ -10321,6 +10361,36 @@
       </p:sp>
       <p:sp>
         <p:nvSpPr>
+          <p:cNvPr id="3" name="Content Placeholder 2"/>
+          <p:cNvSpPr>
+            <a:spLocks noGrp="1"/>
+          </p:cNvSpPr>
+          <p:nvPr>
+            <p:ph idx="1"/>
+          </p:nvPr>
+        </p:nvSpPr>
+        <p:spPr>
+          <a:xfrm>
+            <a:off x="2735913" y="6438900"/>
+            <a:ext cx="3476626" cy="333375"/>
+          </a:xfrm>
+        </p:spPr>
+        <p:txBody>
+          <a:bodyPr/>
+          <a:lstStyle/>
+          <a:p>
+            <a:pPr marL="0" indent="0">
+              <a:buNone/>
+            </a:pPr>
+            <a:r>
+              <a:rPr lang="en-US" sz="1400" dirty="0"/>
+              <a:t>Screenshot from postman of get method</a:t>
+            </a:r>
+          </a:p>
+        </p:txBody>
+      </p:sp>
+      <p:sp>
+        <p:nvSpPr>
           <p:cNvPr id="4" name="Slide Number Placeholder 3"/>
           <p:cNvSpPr>
             <a:spLocks noGrp="1"/>
@@ -10364,50 +10434,18 @@
         </p:blipFill>
         <p:spPr>
           <a:xfrm>
-            <a:off x="1000125" y="2828925"/>
-            <a:ext cx="7829550" cy="2495550"/>
+            <a:off x="1381125" y="1876914"/>
+            <a:ext cx="6762750" cy="4242897"/>
           </a:xfrm>
           <a:prstGeom prst="rect">
             <a:avLst/>
           </a:prstGeom>
         </p:spPr>
       </p:pic>
-      <p:sp>
-        <p:nvSpPr>
-          <p:cNvPr id="6" name="TextBox 5"/>
-          <p:cNvSpPr txBox="1"/>
-          <p:nvPr/>
-        </p:nvSpPr>
-        <p:spPr>
-          <a:xfrm>
-            <a:off x="714375" y="1905000"/>
-            <a:ext cx="2965364" cy="646331"/>
-          </a:xfrm>
-          <a:prstGeom prst="rect">
-            <a:avLst/>
-          </a:prstGeom>
-          <a:noFill/>
-        </p:spPr>
-        <p:txBody>
-          <a:bodyPr wrap="none" rtlCol="0">
-            <a:spAutoFit/>
-          </a:bodyPr>
-          <a:lstStyle/>
-          <a:p>
-            <a:r>
-              <a:rPr lang="en-US" dirty="0"/>
-              <a:t>Example of the POST method:</a:t>
-            </a:r>
-          </a:p>
-          <a:p>
-            <a:endParaRPr lang="en-US" dirty="0"/>
-          </a:p>
-        </p:txBody>
-      </p:sp>
     </p:spTree>
     <p:extLst>
       <p:ext uri="{BB962C8B-B14F-4D97-AF65-F5344CB8AC3E}">
-        <p14:creationId xmlns:p14="http://schemas.microsoft.com/office/powerpoint/2010/main" val="1924377719"/>
+        <p14:creationId xmlns:p14="http://schemas.microsoft.com/office/powerpoint/2010/main" val="1541514851"/>
       </p:ext>
     </p:extLst>
   </p:cSld>
@@ -10458,36 +10496,6 @@
       </p:sp>
       <p:sp>
         <p:nvSpPr>
-          <p:cNvPr id="3" name="Content Placeholder 2"/>
-          <p:cNvSpPr>
-            <a:spLocks noGrp="1"/>
-          </p:cNvSpPr>
-          <p:nvPr>
-            <p:ph idx="1"/>
-          </p:nvPr>
-        </p:nvSpPr>
-        <p:spPr>
-          <a:xfrm>
-            <a:off x="3257549" y="4591050"/>
-            <a:ext cx="2024063" cy="476250"/>
-          </a:xfrm>
-        </p:spPr>
-        <p:txBody>
-          <a:bodyPr/>
-          <a:lstStyle/>
-          <a:p>
-            <a:pPr marL="0" indent="0">
-              <a:buNone/>
-            </a:pPr>
-            <a:r>
-              <a:rPr lang="en-US" sz="1600" dirty="0"/>
-              <a:t>Result in database</a:t>
-            </a:r>
-          </a:p>
-        </p:txBody>
-      </p:sp>
-      <p:sp>
-        <p:nvSpPr>
           <p:cNvPr id="4" name="Slide Number Placeholder 3"/>
           <p:cNvSpPr>
             <a:spLocks noGrp="1"/>
@@ -10531,8 +10539,8 @@
         </p:blipFill>
         <p:spPr>
           <a:xfrm>
-            <a:off x="381000" y="2755726"/>
-            <a:ext cx="8610600" cy="1346548"/>
+            <a:off x="1000125" y="2828925"/>
+            <a:ext cx="7829550" cy="2495550"/>
           </a:xfrm>
           <a:prstGeom prst="rect">
             <a:avLst/>
@@ -10541,206 +10549,40 @@
       </p:pic>
       <p:sp>
         <p:nvSpPr>
-          <p:cNvPr id="6" name="Oval 5"/>
-          <p:cNvSpPr/>
+          <p:cNvPr id="6" name="TextBox 5"/>
+          <p:cNvSpPr txBox="1"/>
           <p:nvPr/>
         </p:nvSpPr>
-        <p:spPr bwMode="auto">
+        <p:spPr>
           <a:xfrm>
-            <a:off x="457200" y="3829050"/>
-            <a:ext cx="800100" cy="381000"/>
+            <a:off x="714375" y="1905000"/>
+            <a:ext cx="2965364" cy="646331"/>
           </a:xfrm>
-          <a:prstGeom prst="ellipse">
+          <a:prstGeom prst="rect">
             <a:avLst/>
           </a:prstGeom>
           <a:noFill/>
-          <a:ln w="9525" cap="flat" cmpd="sng" algn="ctr">
-            <a:noFill/>
-            <a:prstDash val="solid"/>
-            <a:round/>
-            <a:headEnd type="none" w="med" len="med"/>
-            <a:tailEnd type="none" w="med" len="med"/>
-          </a:ln>
-          <a:effectLst/>
-        </p:spPr>
-        <p:txBody>
-          <a:bodyPr vert="horz" wrap="square" lIns="91440" tIns="45720" rIns="91440" bIns="45720" numCol="1" rtlCol="0" anchor="ctr" anchorCtr="0" compatLnSpc="1">
-            <a:prstTxWarp prst="textNoShape">
-              <a:avLst/>
-            </a:prstTxWarp>
+        </p:spPr>
+        <p:txBody>
+          <a:bodyPr wrap="none" rtlCol="0">
             <a:spAutoFit/>
           </a:bodyPr>
           <a:lstStyle/>
           <a:p>
-            <a:pPr marL="228600" marR="0" indent="-228600" algn="l" defTabSz="914400" rtl="0" eaLnBrk="1" fontAlgn="base" latinLnBrk="0" hangingPunct="1">
-              <a:lnSpc>
-                <a:spcPct val="100000"/>
-              </a:lnSpc>
-              <a:spcBef>
-                <a:spcPct val="0"/>
-              </a:spcBef>
-              <a:spcAft>
-                <a:spcPct val="25000"/>
-              </a:spcAft>
-              <a:buClr>
-                <a:schemeClr val="tx1"/>
-              </a:buClr>
-              <a:buSzTx/>
-              <a:buFontTx/>
-              <a:buNone/>
-              <a:tabLst/>
-            </a:pPr>
-            <a:endParaRPr kumimoji="0" lang="en-US" sz="1600" b="0" i="0" u="none" strike="noStrike" cap="none" normalizeH="0" baseline="0">
-              <a:ln>
-                <a:noFill/>
-              </a:ln>
-              <a:solidFill>
-                <a:srgbClr val="275AFF"/>
-              </a:solidFill>
-              <a:effectLst/>
-              <a:latin typeface="Arial" charset="0"/>
-              <a:ea typeface="Times New Roman" pitchFamily="18" charset="0"/>
-              <a:cs typeface="AGaramond" pitchFamily="18" charset="0"/>
-            </a:endParaRPr>
-          </a:p>
-        </p:txBody>
-      </p:sp>
-      <p:sp>
-        <p:nvSpPr>
-          <p:cNvPr id="7" name="Oval 6"/>
-          <p:cNvSpPr/>
-          <p:nvPr/>
-        </p:nvSpPr>
-        <p:spPr bwMode="auto">
-          <a:xfrm>
-            <a:off x="3686175" y="5248275"/>
-            <a:ext cx="1628775" cy="714375"/>
-          </a:xfrm>
-          <a:prstGeom prst="ellipse">
-            <a:avLst/>
-          </a:prstGeom>
-          <a:noFill/>
-          <a:ln w="9525" cap="flat" cmpd="sng" algn="ctr">
-            <a:noFill/>
-            <a:prstDash val="solid"/>
-            <a:round/>
-            <a:headEnd type="none" w="med" len="med"/>
-            <a:tailEnd type="none" w="med" len="med"/>
-          </a:ln>
-          <a:effectLst/>
-        </p:spPr>
-        <p:txBody>
-          <a:bodyPr vert="horz" wrap="square" lIns="91440" tIns="45720" rIns="91440" bIns="45720" numCol="1" rtlCol="0" anchor="ctr" anchorCtr="0" compatLnSpc="1">
-            <a:prstTxWarp prst="textNoShape">
-              <a:avLst/>
-            </a:prstTxWarp>
-            <a:spAutoFit/>
-          </a:bodyPr>
-          <a:lstStyle/>
-          <a:p>
-            <a:pPr marL="228600" marR="0" indent="-228600" algn="l" defTabSz="914400" rtl="0" eaLnBrk="1" fontAlgn="base" latinLnBrk="0" hangingPunct="1">
-              <a:lnSpc>
-                <a:spcPct val="100000"/>
-              </a:lnSpc>
-              <a:spcBef>
-                <a:spcPct val="0"/>
-              </a:spcBef>
-              <a:spcAft>
-                <a:spcPct val="25000"/>
-              </a:spcAft>
-              <a:buClr>
-                <a:schemeClr val="tx1"/>
-              </a:buClr>
-              <a:buSzTx/>
-              <a:buFontTx/>
-              <a:buNone/>
-              <a:tabLst/>
-            </a:pPr>
-            <a:endParaRPr kumimoji="0" lang="en-US" sz="1600" b="0" i="0" u="none" strike="noStrike" cap="none" normalizeH="0" baseline="0">
-              <a:ln>
-                <a:noFill/>
-              </a:ln>
-              <a:solidFill>
-                <a:srgbClr val="275AFF"/>
-              </a:solidFill>
-              <a:effectLst/>
-              <a:latin typeface="Arial" charset="0"/>
-              <a:ea typeface="Times New Roman" pitchFamily="18" charset="0"/>
-              <a:cs typeface="AGaramond" pitchFamily="18" charset="0"/>
-            </a:endParaRPr>
-          </a:p>
-        </p:txBody>
-      </p:sp>
-      <p:sp>
-        <p:nvSpPr>
-          <p:cNvPr id="8" name="Oval 7"/>
-          <p:cNvSpPr/>
-          <p:nvPr/>
-        </p:nvSpPr>
-        <p:spPr bwMode="auto">
-          <a:xfrm>
-            <a:off x="3200400" y="4410075"/>
-            <a:ext cx="2047875" cy="2038350"/>
-          </a:xfrm>
-          <a:prstGeom prst="ellipse">
-            <a:avLst/>
-          </a:prstGeom>
-          <a:noFill/>
-          <a:ln w="9525" cap="flat" cmpd="sng" algn="ctr">
-            <a:noFill/>
-            <a:prstDash val="solid"/>
-            <a:round/>
-            <a:headEnd type="none" w="med" len="med"/>
-            <a:tailEnd type="none" w="med" len="med"/>
-          </a:ln>
-          <a:effectLst/>
-        </p:spPr>
-        <p:txBody>
-          <a:bodyPr vert="horz" wrap="square" lIns="91440" tIns="45720" rIns="91440" bIns="45720" numCol="1" rtlCol="0" anchor="ctr" anchorCtr="0" compatLnSpc="1">
-            <a:prstTxWarp prst="textNoShape">
-              <a:avLst/>
-            </a:prstTxWarp>
-            <a:spAutoFit/>
-          </a:bodyPr>
-          <a:lstStyle/>
-          <a:p>
-            <a:pPr marL="228600" marR="0" indent="-228600" algn="l" defTabSz="914400" rtl="0" eaLnBrk="1" fontAlgn="base" latinLnBrk="0" hangingPunct="1">
-              <a:lnSpc>
-                <a:spcPct val="100000"/>
-              </a:lnSpc>
-              <a:spcBef>
-                <a:spcPct val="0"/>
-              </a:spcBef>
-              <a:spcAft>
-                <a:spcPct val="25000"/>
-              </a:spcAft>
-              <a:buClr>
-                <a:schemeClr val="tx1"/>
-              </a:buClr>
-              <a:buSzTx/>
-              <a:buFontTx/>
-              <a:buNone/>
-              <a:tabLst/>
-            </a:pPr>
-            <a:endParaRPr kumimoji="0" lang="en-US" sz="1600" b="0" i="0" u="none" strike="noStrike" cap="none" normalizeH="0" baseline="0">
-              <a:ln>
-                <a:noFill/>
-              </a:ln>
-              <a:solidFill>
-                <a:srgbClr val="275AFF"/>
-              </a:solidFill>
-              <a:effectLst/>
-              <a:latin typeface="Arial" charset="0"/>
-              <a:ea typeface="Times New Roman" pitchFamily="18" charset="0"/>
-              <a:cs typeface="AGaramond" pitchFamily="18" charset="0"/>
-            </a:endParaRPr>
+            <a:r>
+              <a:rPr lang="en-US" dirty="0"/>
+              <a:t>Example of the POST method:</a:t>
+            </a:r>
+          </a:p>
+          <a:p>
+            <a:endParaRPr lang="en-US" dirty="0"/>
           </a:p>
         </p:txBody>
       </p:sp>
     </p:spTree>
     <p:extLst>
       <p:ext uri="{BB962C8B-B14F-4D97-AF65-F5344CB8AC3E}">
-        <p14:creationId xmlns:p14="http://schemas.microsoft.com/office/powerpoint/2010/main" val="631626606"/>
+        <p14:creationId xmlns:p14="http://schemas.microsoft.com/office/powerpoint/2010/main" val="1924377719"/>
       </p:ext>
     </p:extLst>
   </p:cSld>
@@ -10784,9 +10626,8 @@
           <a:p>
             <a:r>
               <a:rPr lang="en-US" sz="3600" dirty="0"/>
-              <a:t>Difficulties and Lessons</a:t>
-            </a:r>
-            <a:endParaRPr lang="en-US" dirty="0"/>
+              <a:t>Implementation</a:t>
+            </a:r>
           </a:p>
         </p:txBody>
       </p:sp>
@@ -10800,52 +10641,23 @@
             <p:ph idx="1"/>
           </p:nvPr>
         </p:nvSpPr>
-        <p:spPr/>
+        <p:spPr>
+          <a:xfrm>
+            <a:off x="3257549" y="4591050"/>
+            <a:ext cx="2024063" cy="476250"/>
+          </a:xfrm>
+        </p:spPr>
         <p:txBody>
           <a:bodyPr/>
           <a:lstStyle/>
           <a:p>
-            <a:r>
-              <a:rPr lang="en-US" sz="2800" dirty="0"/>
-              <a:t>Didn’t know how to create a standard layered structure at the beginning, mixed domain layer and DAC layer </a:t>
-            </a:r>
-          </a:p>
-          <a:p>
-            <a:r>
-              <a:rPr lang="en-US" sz="2800" dirty="0"/>
-              <a:t>Know how to create it in class</a:t>
-            </a:r>
-          </a:p>
-          <a:p>
-            <a:r>
-              <a:rPr lang="en-US" sz="2800" dirty="0"/>
-              <a:t>Had difficulty to write a post commend and finally figure it out</a:t>
-            </a:r>
-          </a:p>
-          <a:p>
-            <a:r>
-              <a:rPr lang="en-US" sz="2800" dirty="0"/>
-              <a:t>The most important is to understand what </a:t>
-            </a:r>
-            <a:r>
-              <a:rPr lang="en-US" sz="2800" dirty="0" err="1"/>
-              <a:t>ReST</a:t>
-            </a:r>
-            <a:r>
-              <a:rPr lang="en-US" sz="2800" dirty="0"/>
-              <a:t> is, how it works and how to develop a </a:t>
-            </a:r>
-            <a:r>
-              <a:rPr lang="en-US" sz="2800" dirty="0" err="1"/>
-              <a:t>ReST</a:t>
-            </a:r>
-            <a:r>
-              <a:rPr lang="en-US" sz="2800" dirty="0"/>
-              <a:t> program</a:t>
-            </a:r>
-          </a:p>
-          <a:p>
-            <a:endParaRPr lang="en-US" dirty="0"/>
+            <a:pPr marL="0" indent="0">
+              <a:buNone/>
+            </a:pPr>
+            <a:r>
+              <a:rPr lang="en-US" sz="1600" dirty="0"/>
+              <a:t>Result in database</a:t>
+            </a:r>
           </a:p>
         </p:txBody>
       </p:sp>
@@ -10878,10 +10690,208 @@
           </a:p>
         </p:txBody>
       </p:sp>
+      <p:sp>
+        <p:nvSpPr>
+          <p:cNvPr id="6" name="Oval 5"/>
+          <p:cNvSpPr/>
+          <p:nvPr/>
+        </p:nvSpPr>
+        <p:spPr bwMode="auto">
+          <a:xfrm>
+            <a:off x="457200" y="3829050"/>
+            <a:ext cx="800100" cy="381000"/>
+          </a:xfrm>
+          <a:prstGeom prst="ellipse">
+            <a:avLst/>
+          </a:prstGeom>
+          <a:noFill/>
+          <a:ln w="9525" cap="flat" cmpd="sng" algn="ctr">
+            <a:noFill/>
+            <a:prstDash val="solid"/>
+            <a:round/>
+            <a:headEnd type="none" w="med" len="med"/>
+            <a:tailEnd type="none" w="med" len="med"/>
+          </a:ln>
+          <a:effectLst/>
+        </p:spPr>
+        <p:txBody>
+          <a:bodyPr vert="horz" wrap="square" lIns="91440" tIns="45720" rIns="91440" bIns="45720" numCol="1" rtlCol="0" anchor="ctr" anchorCtr="0" compatLnSpc="1">
+            <a:prstTxWarp prst="textNoShape">
+              <a:avLst/>
+            </a:prstTxWarp>
+            <a:spAutoFit/>
+          </a:bodyPr>
+          <a:lstStyle/>
+          <a:p>
+            <a:pPr marL="228600" marR="0" indent="-228600" algn="l" defTabSz="914400" rtl="0" eaLnBrk="1" fontAlgn="base" latinLnBrk="0" hangingPunct="1">
+              <a:lnSpc>
+                <a:spcPct val="100000"/>
+              </a:lnSpc>
+              <a:spcBef>
+                <a:spcPct val="0"/>
+              </a:spcBef>
+              <a:spcAft>
+                <a:spcPct val="25000"/>
+              </a:spcAft>
+              <a:buClr>
+                <a:schemeClr val="tx1"/>
+              </a:buClr>
+              <a:buSzTx/>
+              <a:buFontTx/>
+              <a:buNone/>
+              <a:tabLst/>
+            </a:pPr>
+            <a:endParaRPr kumimoji="0" lang="en-US" sz="1600" b="0" i="0" u="none" strike="noStrike" cap="none" normalizeH="0" baseline="0">
+              <a:ln>
+                <a:noFill/>
+              </a:ln>
+              <a:solidFill>
+                <a:srgbClr val="275AFF"/>
+              </a:solidFill>
+              <a:effectLst/>
+              <a:latin typeface="Arial" charset="0"/>
+              <a:ea typeface="Times New Roman" pitchFamily="18" charset="0"/>
+              <a:cs typeface="AGaramond" pitchFamily="18" charset="0"/>
+            </a:endParaRPr>
+          </a:p>
+        </p:txBody>
+      </p:sp>
+      <p:sp>
+        <p:nvSpPr>
+          <p:cNvPr id="7" name="Oval 6"/>
+          <p:cNvSpPr/>
+          <p:nvPr/>
+        </p:nvSpPr>
+        <p:spPr bwMode="auto">
+          <a:xfrm>
+            <a:off x="3686175" y="5248275"/>
+            <a:ext cx="1628775" cy="714375"/>
+          </a:xfrm>
+          <a:prstGeom prst="ellipse">
+            <a:avLst/>
+          </a:prstGeom>
+          <a:noFill/>
+          <a:ln w="9525" cap="flat" cmpd="sng" algn="ctr">
+            <a:noFill/>
+            <a:prstDash val="solid"/>
+            <a:round/>
+            <a:headEnd type="none" w="med" len="med"/>
+            <a:tailEnd type="none" w="med" len="med"/>
+          </a:ln>
+          <a:effectLst/>
+        </p:spPr>
+        <p:txBody>
+          <a:bodyPr vert="horz" wrap="square" lIns="91440" tIns="45720" rIns="91440" bIns="45720" numCol="1" rtlCol="0" anchor="ctr" anchorCtr="0" compatLnSpc="1">
+            <a:prstTxWarp prst="textNoShape">
+              <a:avLst/>
+            </a:prstTxWarp>
+            <a:spAutoFit/>
+          </a:bodyPr>
+          <a:lstStyle/>
+          <a:p>
+            <a:pPr marL="228600" marR="0" indent="-228600" algn="l" defTabSz="914400" rtl="0" eaLnBrk="1" fontAlgn="base" latinLnBrk="0" hangingPunct="1">
+              <a:lnSpc>
+                <a:spcPct val="100000"/>
+              </a:lnSpc>
+              <a:spcBef>
+                <a:spcPct val="0"/>
+              </a:spcBef>
+              <a:spcAft>
+                <a:spcPct val="25000"/>
+              </a:spcAft>
+              <a:buClr>
+                <a:schemeClr val="tx1"/>
+              </a:buClr>
+              <a:buSzTx/>
+              <a:buFontTx/>
+              <a:buNone/>
+              <a:tabLst/>
+            </a:pPr>
+            <a:endParaRPr kumimoji="0" lang="en-US" sz="1600" b="0" i="0" u="none" strike="noStrike" cap="none" normalizeH="0" baseline="0">
+              <a:ln>
+                <a:noFill/>
+              </a:ln>
+              <a:solidFill>
+                <a:srgbClr val="275AFF"/>
+              </a:solidFill>
+              <a:effectLst/>
+              <a:latin typeface="Arial" charset="0"/>
+              <a:ea typeface="Times New Roman" pitchFamily="18" charset="0"/>
+              <a:cs typeface="AGaramond" pitchFamily="18" charset="0"/>
+            </a:endParaRPr>
+          </a:p>
+        </p:txBody>
+      </p:sp>
+      <p:sp>
+        <p:nvSpPr>
+          <p:cNvPr id="8" name="Oval 7"/>
+          <p:cNvSpPr/>
+          <p:nvPr/>
+        </p:nvSpPr>
+        <p:spPr bwMode="auto">
+          <a:xfrm>
+            <a:off x="3200400" y="4410075"/>
+            <a:ext cx="2047875" cy="2038350"/>
+          </a:xfrm>
+          <a:prstGeom prst="ellipse">
+            <a:avLst/>
+          </a:prstGeom>
+          <a:noFill/>
+          <a:ln w="9525" cap="flat" cmpd="sng" algn="ctr">
+            <a:noFill/>
+            <a:prstDash val="solid"/>
+            <a:round/>
+            <a:headEnd type="none" w="med" len="med"/>
+            <a:tailEnd type="none" w="med" len="med"/>
+          </a:ln>
+          <a:effectLst/>
+        </p:spPr>
+        <p:txBody>
+          <a:bodyPr vert="horz" wrap="square" lIns="91440" tIns="45720" rIns="91440" bIns="45720" numCol="1" rtlCol="0" anchor="ctr" anchorCtr="0" compatLnSpc="1">
+            <a:prstTxWarp prst="textNoShape">
+              <a:avLst/>
+            </a:prstTxWarp>
+            <a:spAutoFit/>
+          </a:bodyPr>
+          <a:lstStyle/>
+          <a:p>
+            <a:pPr marL="228600" marR="0" indent="-228600" algn="l" defTabSz="914400" rtl="0" eaLnBrk="1" fontAlgn="base" latinLnBrk="0" hangingPunct="1">
+              <a:lnSpc>
+                <a:spcPct val="100000"/>
+              </a:lnSpc>
+              <a:spcBef>
+                <a:spcPct val="0"/>
+              </a:spcBef>
+              <a:spcAft>
+                <a:spcPct val="25000"/>
+              </a:spcAft>
+              <a:buClr>
+                <a:schemeClr val="tx1"/>
+              </a:buClr>
+              <a:buSzTx/>
+              <a:buFontTx/>
+              <a:buNone/>
+              <a:tabLst/>
+            </a:pPr>
+            <a:endParaRPr kumimoji="0" lang="en-US" sz="1600" b="0" i="0" u="none" strike="noStrike" cap="none" normalizeH="0" baseline="0">
+              <a:ln>
+                <a:noFill/>
+              </a:ln>
+              <a:solidFill>
+                <a:srgbClr val="275AFF"/>
+              </a:solidFill>
+              <a:effectLst/>
+              <a:latin typeface="Arial" charset="0"/>
+              <a:ea typeface="Times New Roman" pitchFamily="18" charset="0"/>
+              <a:cs typeface="AGaramond" pitchFamily="18" charset="0"/>
+            </a:endParaRPr>
+          </a:p>
+        </p:txBody>
+      </p:sp>
     </p:spTree>
     <p:extLst>
       <p:ext uri="{BB962C8B-B14F-4D97-AF65-F5344CB8AC3E}">
-        <p14:creationId xmlns:p14="http://schemas.microsoft.com/office/powerpoint/2010/main" val="4231949637"/>
+        <p14:creationId xmlns:p14="http://schemas.microsoft.com/office/powerpoint/2010/main" val="631626606"/>
       </p:ext>
     </p:extLst>
   </p:cSld>
@@ -10910,12 +10920,12 @@
       </p:grpSpPr>
       <p:sp>
         <p:nvSpPr>
-          <p:cNvPr id="3" name="Content Placeholder 2"/>
+          <p:cNvPr id="2" name="Title 1"/>
           <p:cNvSpPr>
             <a:spLocks noGrp="1"/>
           </p:cNvSpPr>
           <p:nvPr>
-            <p:ph idx="1"/>
+            <p:ph type="title"/>
           </p:nvPr>
         </p:nvSpPr>
         <p:spPr/>
@@ -10923,36 +10933,70 @@
           <a:bodyPr/>
           <a:lstStyle/>
           <a:p>
-            <a:pPr marL="0" indent="0">
-              <a:buNone/>
-            </a:pPr>
-            <a:r>
-              <a:rPr lang="en-US" sz="4400" dirty="0"/>
-              <a:t>                 </a:t>
-            </a:r>
-          </a:p>
-          <a:p>
-            <a:pPr marL="0" indent="0">
-              <a:buNone/>
-            </a:pPr>
-            <a:endParaRPr lang="en-US" sz="4400" dirty="0"/>
-          </a:p>
-          <a:p>
-            <a:pPr marL="0" indent="0">
-              <a:buNone/>
-            </a:pPr>
-            <a:r>
-              <a:rPr lang="en-US" sz="4400" dirty="0"/>
-              <a:t>         </a:t>
-            </a:r>
-            <a:r>
-              <a:rPr lang="en-US" sz="6600" i="1" dirty="0">
-                <a:solidFill>
-                  <a:srgbClr val="680000"/>
-                </a:solidFill>
-              </a:rPr>
-              <a:t>THANK YOU!</a:t>
-            </a:r>
+            <a:r>
+              <a:rPr lang="en-US" sz="3600" dirty="0"/>
+              <a:t>Difficulties and Lessons</a:t>
+            </a:r>
+            <a:endParaRPr lang="en-US" dirty="0"/>
+          </a:p>
+        </p:txBody>
+      </p:sp>
+      <p:sp>
+        <p:nvSpPr>
+          <p:cNvPr id="3" name="Content Placeholder 2"/>
+          <p:cNvSpPr>
+            <a:spLocks noGrp="1"/>
+          </p:cNvSpPr>
+          <p:nvPr>
+            <p:ph idx="1"/>
+          </p:nvPr>
+        </p:nvSpPr>
+        <p:spPr/>
+        <p:txBody>
+          <a:bodyPr/>
+          <a:lstStyle/>
+          <a:p>
+            <a:r>
+              <a:rPr lang="en-US" sz="2800" dirty="0"/>
+              <a:t>Didn’t know how to create a standard layered structure at the beginning, mixed domain layer and DAC layer </a:t>
+            </a:r>
+          </a:p>
+          <a:p>
+            <a:r>
+              <a:rPr lang="en-US" sz="2800" dirty="0"/>
+              <a:t>Know how to create it in class</a:t>
+            </a:r>
+          </a:p>
+          <a:p>
+            <a:r>
+              <a:rPr lang="en-US" sz="2800" dirty="0"/>
+              <a:t>Had difficulty to write a post commend and finally figure it out</a:t>
+            </a:r>
+          </a:p>
+          <a:p>
+            <a:r>
+              <a:rPr lang="en-US" sz="2800" dirty="0"/>
+              <a:t>The most important is to understand what </a:t>
+            </a:r>
+            <a:r>
+              <a:rPr lang="en-US" sz="2800" dirty="0" err="1"/>
+              <a:t>ReST</a:t>
+            </a:r>
+            <a:r>
+              <a:rPr lang="en-US" sz="2800" dirty="0"/>
+              <a:t> is, how it works and how to develop a </a:t>
+            </a:r>
+            <a:r>
+              <a:rPr lang="en-US" sz="2800" dirty="0" err="1"/>
+              <a:t>ReST</a:t>
+            </a:r>
+            <a:r>
+              <a:rPr lang="en-US" sz="2800" dirty="0"/>
+              <a:t> program</a:t>
+            </a:r>
+          </a:p>
+          <a:p>
+            <a:endParaRPr lang="en-US" dirty="0"/>
           </a:p>
         </p:txBody>
       </p:sp>
@@ -10980,6 +11024,113 @@
                 <a:defRPr/>
               </a:pPr>
               <a:t>18</a:t>
+            </a:fld>
+            <a:endParaRPr lang="en-US"/>
+          </a:p>
+        </p:txBody>
+      </p:sp>
+    </p:spTree>
+    <p:extLst>
+      <p:ext uri="{BB962C8B-B14F-4D97-AF65-F5344CB8AC3E}">
+        <p14:creationId xmlns:p14="http://schemas.microsoft.com/office/powerpoint/2010/main" val="4231949637"/>
+      </p:ext>
+    </p:extLst>
+  </p:cSld>
+  <p:clrMapOvr>
+    <a:masterClrMapping/>
+  </p:clrMapOvr>
+</p:sld>
+</file>
+
+<file path=ppt/slides/slide19.xml><?xml version="1.0" encoding="utf-8"?>
+<p:sld xmlns:a="http://schemas.openxmlformats.org/drawingml/2006/main" xmlns:r="http://schemas.openxmlformats.org/officeDocument/2006/relationships" xmlns:p="http://schemas.openxmlformats.org/presentationml/2006/main">
+  <p:cSld>
+    <p:spTree>
+      <p:nvGrpSpPr>
+        <p:cNvPr id="1" name=""/>
+        <p:cNvGrpSpPr/>
+        <p:nvPr/>
+      </p:nvGrpSpPr>
+      <p:grpSpPr>
+        <a:xfrm>
+          <a:off x="0" y="0"/>
+          <a:ext cx="0" cy="0"/>
+          <a:chOff x="0" y="0"/>
+          <a:chExt cx="0" cy="0"/>
+        </a:xfrm>
+      </p:grpSpPr>
+      <p:sp>
+        <p:nvSpPr>
+          <p:cNvPr id="3" name="Content Placeholder 2"/>
+          <p:cNvSpPr>
+            <a:spLocks noGrp="1"/>
+          </p:cNvSpPr>
+          <p:nvPr>
+            <p:ph idx="1"/>
+          </p:nvPr>
+        </p:nvSpPr>
+        <p:spPr/>
+        <p:txBody>
+          <a:bodyPr/>
+          <a:lstStyle/>
+          <a:p>
+            <a:pPr marL="0" indent="0">
+              <a:buNone/>
+            </a:pPr>
+            <a:r>
+              <a:rPr lang="en-US" sz="4400" dirty="0"/>
+              <a:t>                 </a:t>
+            </a:r>
+          </a:p>
+          <a:p>
+            <a:pPr marL="0" indent="0">
+              <a:buNone/>
+            </a:pPr>
+            <a:endParaRPr lang="en-US" sz="4400" dirty="0"/>
+          </a:p>
+          <a:p>
+            <a:pPr marL="0" indent="0">
+              <a:buNone/>
+            </a:pPr>
+            <a:r>
+              <a:rPr lang="en-US" sz="4400" dirty="0"/>
+              <a:t>         </a:t>
+            </a:r>
+            <a:r>
+              <a:rPr lang="en-US" sz="6600" i="1" dirty="0">
+                <a:solidFill>
+                  <a:srgbClr val="680000"/>
+                </a:solidFill>
+              </a:rPr>
+              <a:t>THANK YOU!</a:t>
+            </a:r>
+          </a:p>
+        </p:txBody>
+      </p:sp>
+      <p:sp>
+        <p:nvSpPr>
+          <p:cNvPr id="4" name="Slide Number Placeholder 3"/>
+          <p:cNvSpPr>
+            <a:spLocks noGrp="1"/>
+          </p:cNvSpPr>
+          <p:nvPr>
+            <p:ph type="sldNum" sz="quarter" idx="10"/>
+          </p:nvPr>
+        </p:nvSpPr>
+        <p:spPr/>
+        <p:txBody>
+          <a:bodyPr/>
+          <a:lstStyle/>
+          <a:p>
+            <a:pPr>
+              <a:defRPr/>
+            </a:pPr>
+            <a:fld id="{C09B9D2E-8DA2-4A45-82A9-24FA37AAA5DD}" type="slidenum">
+              <a:rPr lang="en-US" smtClean="0"/>
+              <a:pPr>
+                <a:defRPr/>
+              </a:pPr>
+              <a:t>19</a:t>
             </a:fld>
             <a:endParaRPr lang="en-US"/>
           </a:p>
@@ -11222,13 +11373,8 @@
             </a:pPr>
             <a:r>
               <a:rPr lang="en-US" dirty="0"/>
-              <a:t>A online purchasing </a:t>
-            </a:r>
-            <a:r>
-              <a:rPr lang="en-US" dirty="0" smtClean="0"/>
-              <a:t>platform for customers</a:t>
-            </a:r>
-            <a:endParaRPr lang="en-US" dirty="0"/>
+              <a:t>A online purchasing platform for customers</a:t>
+            </a:r>
           </a:p>
           <a:p>
             <a:pPr marL="0" indent="0" eaLnBrk="1" hangingPunct="1">
@@ -11263,13 +11409,8 @@
             </a:pPr>
             <a:r>
               <a:rPr lang="en-US" sz="1600" dirty="0"/>
-              <a:t>		- </a:t>
-            </a:r>
-            <a:r>
-              <a:rPr lang="en-US" sz="1600" dirty="0" smtClean="0"/>
-              <a:t>Buy product</a:t>
-            </a:r>
-            <a:endParaRPr lang="en-US" sz="1600" dirty="0"/>
+              <a:t>		- Buy product</a:t>
+            </a:r>
           </a:p>
           <a:p>
             <a:pPr marL="0" indent="0" eaLnBrk="1" hangingPunct="1">
@@ -11280,15 +11421,7 @@
             </a:pPr>
             <a:r>
               <a:rPr lang="en-US" sz="1600" dirty="0"/>
-              <a:t>		- </a:t>
-            </a:r>
-            <a:r>
-              <a:rPr lang="en-US" sz="1600" dirty="0" smtClean="0"/>
-              <a:t>Check </a:t>
-            </a:r>
-            <a:r>
-              <a:rPr lang="en-US" sz="1600" dirty="0"/>
-              <a:t>order status</a:t>
+              <a:t>		- Check order status</a:t>
             </a:r>
           </a:p>
           <a:p>
@@ -11300,13 +11433,8 @@
             </a:pPr>
             <a:r>
               <a:rPr lang="en-US" sz="1600" dirty="0"/>
-              <a:t>		- </a:t>
-            </a:r>
-            <a:r>
-              <a:rPr lang="en-US" sz="1600" dirty="0" smtClean="0"/>
-              <a:t>Cancel order                           </a:t>
-            </a:r>
-            <a:endParaRPr lang="en-US" sz="1600" dirty="0"/>
+              <a:t>		- Cancel order                           </a:t>
+            </a:r>
           </a:p>
           <a:p>
             <a:pPr marL="0" indent="0" eaLnBrk="1" hangingPunct="1">
@@ -11324,18 +11452,9 @@
               </a:spcBef>
             </a:pPr>
             <a:r>
-              <a:rPr lang="en-US" dirty="0" smtClean="0"/>
-              <a:t>Order/inventory management platform for </a:t>
-            </a:r>
-            <a:r>
-              <a:rPr lang="en-US" dirty="0" smtClean="0"/>
-              <a:t>p</a:t>
-            </a:r>
-            <a:r>
-              <a:rPr lang="en-US" dirty="0" smtClean="0"/>
-              <a:t>artners</a:t>
-            </a:r>
-            <a:endParaRPr lang="en-US" dirty="0"/>
+              <a:rPr lang="en-US" dirty="0"/>
+              <a:t>Order/inventory management platform for partners</a:t>
+            </a:r>
           </a:p>
           <a:p>
             <a:pPr marL="0" indent="0" eaLnBrk="1" hangingPunct="1">
@@ -11358,13 +11477,8 @@
             </a:pPr>
             <a:r>
               <a:rPr lang="en-US" sz="1600" dirty="0"/>
-              <a:t>		- Add products in market </a:t>
-            </a:r>
-            <a:r>
-              <a:rPr lang="en-US" sz="1600" dirty="0" smtClean="0"/>
-              <a:t>place</a:t>
-            </a:r>
-            <a:endParaRPr lang="en-US" sz="1600" dirty="0"/>
+              <a:t>		- Add products in market place</a:t>
+            </a:r>
           </a:p>
           <a:p>
             <a:pPr marL="0" indent="0" eaLnBrk="1" hangingPunct="1">
@@ -11375,11 +11489,7 @@
             </a:pPr>
             <a:r>
               <a:rPr lang="en-US" sz="1600" dirty="0"/>
-              <a:t>		- Get acknowledgement of order </a:t>
-            </a:r>
-            <a:r>
-              <a:rPr lang="en-US" sz="1600" dirty="0" smtClean="0"/>
-              <a:t>fulfillment</a:t>
+              <a:t>		- Get acknowledgement of order fulfillment</a:t>
             </a:r>
           </a:p>
           <a:p>
@@ -11391,21 +11501,8 @@
             </a:pPr>
             <a:r>
               <a:rPr lang="en-US" sz="1600" dirty="0"/>
-              <a:t>	</a:t>
-            </a:r>
-            <a:r>
-              <a:rPr lang="en-US" sz="1600" dirty="0" smtClean="0"/>
-              <a:t>	- </a:t>
-            </a:r>
-            <a:r>
-              <a:rPr lang="en-US" sz="1600" dirty="0"/>
-              <a:t>S</a:t>
-            </a:r>
-            <a:r>
-              <a:rPr lang="en-US" sz="1600" dirty="0" smtClean="0"/>
-              <a:t>hip order</a:t>
-            </a:r>
-            <a:endParaRPr lang="en-US" sz="1600" dirty="0"/>
+              <a:t>		- Ship order</a:t>
+            </a:r>
           </a:p>
           <a:p>
             <a:pPr eaLnBrk="1" hangingPunct="1">
@@ -11464,7 +11561,7 @@
   <p:timing>
     <p:tnLst>
       <p:par>
-        <p:cTn xmlns:p14="http://schemas.microsoft.com/office/powerpoint/2010/main" id="1" dur="indefinite" restart="never" nodeType="tmRoot">
+        <p:cTn id="1" dur="indefinite" restart="never" nodeType="tmRoot">
           <p:childTnLst>
             <p:seq concurrent="1" nextAc="seek">
               <p:cTn id="2" dur="indefinite" nodeType="mainSeq">
@@ -12012,11 +12109,7 @@
           <a:p>
             <a:r>
               <a:rPr lang="en-US" sz="3600" dirty="0"/>
-              <a:t>Project </a:t>
-            </a:r>
-            <a:r>
-              <a:rPr lang="en-US" sz="3600" dirty="0" smtClean="0"/>
-              <a:t>Architecture</a:t>
+              <a:t>Project Overall Idea</a:t>
             </a:r>
             <a:endParaRPr lang="en-US" sz="3600" dirty="0"/>
           </a:p>
@@ -12043,10 +12136,9 @@
           <a:lstStyle/>
           <a:p>
             <a:r>
-              <a:rPr lang="en-US" dirty="0" smtClean="0"/>
+              <a:rPr lang="en-US" dirty="0"/>
               <a:t>State diagram (customer)</a:t>
             </a:r>
-            <a:endParaRPr lang="en-US" dirty="0"/>
           </a:p>
           <a:p>
             <a:pPr marL="0" indent="0">
@@ -12152,7 +12244,7 @@
               <a:buNone/>
               <a:tabLst/>
             </a:pPr>
-            <a:endParaRPr kumimoji="0" lang="en-US" sz="1600" b="0" i="0" u="none" strike="noStrike" cap="none" normalizeH="0" baseline="0" smtClean="0">
+            <a:endParaRPr kumimoji="0" lang="en-US" sz="1600" b="0" i="0" u="none" strike="noStrike" cap="none" normalizeH="0" baseline="0">
               <a:ln>
                 <a:noFill/>
               </a:ln>
@@ -12190,16 +12282,15 @@
           <a:lstStyle/>
           <a:p>
             <a:r>
-              <a:rPr lang="en-US" dirty="0" smtClean="0"/>
+              <a:rPr lang="en-US" dirty="0"/>
               <a:t>Home</a:t>
             </a:r>
           </a:p>
           <a:p>
             <a:r>
-              <a:rPr lang="en-US" dirty="0" smtClean="0"/>
+              <a:rPr lang="en-US" dirty="0"/>
               <a:t>(product listing)</a:t>
             </a:r>
-            <a:endParaRPr lang="en-US" dirty="0"/>
           </a:p>
         </p:txBody>
       </p:sp>
@@ -12226,18 +12317,13 @@
           <a:lstStyle/>
           <a:p>
             <a:r>
-              <a:rPr lang="en-US" dirty="0" smtClean="0">
+              <a:rPr lang="en-US" dirty="0">
                 <a:solidFill>
                   <a:srgbClr val="FF0000"/>
                 </a:solidFill>
               </a:rPr>
               <a:t>Buy product</a:t>
             </a:r>
-            <a:endParaRPr lang="en-US" dirty="0">
-              <a:solidFill>
-                <a:srgbClr val="FF0000"/>
-              </a:solidFill>
-            </a:endParaRPr>
           </a:p>
         </p:txBody>
       </p:sp>
@@ -12264,10 +12350,9 @@
           <a:lstStyle/>
           <a:p>
             <a:r>
-              <a:rPr lang="en-US" dirty="0" smtClean="0"/>
+              <a:rPr lang="en-US" dirty="0"/>
               <a:t>Search product</a:t>
             </a:r>
-            <a:endParaRPr lang="en-US" dirty="0"/>
           </a:p>
         </p:txBody>
       </p:sp>
@@ -12330,7 +12415,7 @@
               <a:buNone/>
               <a:tabLst/>
             </a:pPr>
-            <a:endParaRPr kumimoji="0" lang="en-US" sz="1600" b="0" i="0" u="none" strike="noStrike" cap="none" normalizeH="0" baseline="0" smtClean="0">
+            <a:endParaRPr kumimoji="0" lang="en-US" sz="1600" b="0" i="0" u="none" strike="noStrike" cap="none" normalizeH="0" baseline="0">
               <a:ln>
                 <a:noFill/>
               </a:ln>
@@ -12404,7 +12489,7 @@
               <a:buNone/>
               <a:tabLst/>
             </a:pPr>
-            <a:endParaRPr kumimoji="0" lang="en-US" sz="1600" b="0" i="0" u="none" strike="noStrike" cap="none" normalizeH="0" baseline="0" smtClean="0">
+            <a:endParaRPr kumimoji="0" lang="en-US" sz="1600" b="0" i="0" u="none" strike="noStrike" cap="none" normalizeH="0" baseline="0">
               <a:ln>
                 <a:noFill/>
               </a:ln>
@@ -12477,7 +12562,7 @@
               <a:buNone/>
               <a:tabLst/>
             </a:pPr>
-            <a:endParaRPr kumimoji="0" lang="en-US" sz="1600" b="0" i="0" u="none" strike="noStrike" cap="none" normalizeH="0" baseline="0" smtClean="0">
+            <a:endParaRPr kumimoji="0" lang="en-US" sz="1600" b="0" i="0" u="none" strike="noStrike" cap="none" normalizeH="0" baseline="0">
               <a:ln>
                 <a:noFill/>
               </a:ln>
@@ -12515,10 +12600,9 @@
           <a:lstStyle/>
           <a:p>
             <a:r>
-              <a:rPr lang="en-US" dirty="0" smtClean="0"/>
+              <a:rPr lang="en-US" dirty="0"/>
               <a:t>Check orders</a:t>
             </a:r>
-            <a:endParaRPr lang="en-US" dirty="0"/>
           </a:p>
         </p:txBody>
       </p:sp>
@@ -12575,7 +12659,7 @@
               <a:buNone/>
               <a:tabLst/>
             </a:pPr>
-            <a:endParaRPr kumimoji="0" lang="en-US" sz="1600" b="0" i="0" u="none" strike="noStrike" cap="none" normalizeH="0" baseline="0" smtClean="0">
+            <a:endParaRPr kumimoji="0" lang="en-US" sz="1600" b="0" i="0" u="none" strike="noStrike" cap="none" normalizeH="0" baseline="0">
               <a:ln>
                 <a:noFill/>
               </a:ln>
@@ -12613,10 +12697,9 @@
           <a:lstStyle/>
           <a:p>
             <a:r>
-              <a:rPr lang="en-US" dirty="0" smtClean="0"/>
+              <a:rPr lang="en-US" dirty="0"/>
               <a:t>Order listing</a:t>
             </a:r>
-            <a:endParaRPr lang="en-US" dirty="0"/>
           </a:p>
         </p:txBody>
       </p:sp>
@@ -12643,18 +12726,13 @@
           <a:lstStyle/>
           <a:p>
             <a:r>
-              <a:rPr lang="en-US" dirty="0" smtClean="0">
+              <a:rPr lang="en-US" dirty="0">
                 <a:solidFill>
                   <a:srgbClr val="FF0000"/>
                 </a:solidFill>
               </a:rPr>
               <a:t>Cancel order</a:t>
             </a:r>
-            <a:endParaRPr lang="en-US" dirty="0">
-              <a:solidFill>
-                <a:srgbClr val="FF0000"/>
-              </a:solidFill>
-            </a:endParaRPr>
           </a:p>
         </p:txBody>
       </p:sp>
@@ -12717,7 +12795,7 @@
               <a:buNone/>
               <a:tabLst/>
             </a:pPr>
-            <a:endParaRPr kumimoji="0" lang="en-US" sz="1600" b="0" i="0" u="none" strike="noStrike" cap="none" normalizeH="0" baseline="0" smtClean="0">
+            <a:endParaRPr kumimoji="0" lang="en-US" sz="1600" b="0" i="0" u="none" strike="noStrike" cap="none" normalizeH="0" baseline="0">
               <a:ln>
                 <a:noFill/>
               </a:ln>
@@ -12785,7 +12863,7 @@
               <a:buNone/>
               <a:tabLst/>
             </a:pPr>
-            <a:endParaRPr kumimoji="0" lang="en-US" sz="1600" b="0" i="0" u="none" strike="noStrike" cap="none" normalizeH="0" baseline="0" smtClean="0">
+            <a:endParaRPr kumimoji="0" lang="en-US" sz="1600" b="0" i="0" u="none" strike="noStrike" cap="none" normalizeH="0" baseline="0">
               <a:ln>
                 <a:noFill/>
               </a:ln>
@@ -12823,16 +12901,15 @@
           <a:lstStyle/>
           <a:p>
             <a:r>
-              <a:rPr lang="en-US" dirty="0" smtClean="0"/>
+              <a:rPr lang="en-US" dirty="0"/>
               <a:t>Home</a:t>
             </a:r>
           </a:p>
           <a:p>
             <a:r>
-              <a:rPr lang="en-US" dirty="0" smtClean="0"/>
+              <a:rPr lang="en-US" dirty="0"/>
               <a:t>(product listing – minimal actions enabled)</a:t>
             </a:r>
-            <a:endParaRPr lang="en-US" dirty="0"/>
           </a:p>
         </p:txBody>
       </p:sp>
@@ -12894,7 +12971,7 @@
               <a:buNone/>
               <a:tabLst/>
             </a:pPr>
-            <a:endParaRPr kumimoji="0" lang="en-US" sz="1600" b="0" i="0" u="none" strike="noStrike" cap="none" normalizeH="0" baseline="0" smtClean="0">
+            <a:endParaRPr kumimoji="0" lang="en-US" sz="1600" b="0" i="0" u="none" strike="noStrike" cap="none" normalizeH="0" baseline="0">
               <a:ln>
                 <a:noFill/>
               </a:ln>
@@ -12932,10 +13009,9 @@
           <a:lstStyle/>
           <a:p>
             <a:r>
-              <a:rPr lang="en-US" dirty="0" smtClean="0"/>
+              <a:rPr lang="en-US" dirty="0"/>
               <a:t>Log in</a:t>
             </a:r>
-            <a:endParaRPr lang="en-US" dirty="0"/>
           </a:p>
         </p:txBody>
       </p:sp>
@@ -12986,11 +13062,7 @@
           <a:p>
             <a:r>
               <a:rPr lang="en-US" sz="3600" dirty="0"/>
-              <a:t>Project </a:t>
-            </a:r>
-            <a:r>
-              <a:rPr lang="en-US" sz="3600" dirty="0" smtClean="0"/>
-              <a:t>Architecture</a:t>
+              <a:t>Project Overall Idea</a:t>
             </a:r>
             <a:endParaRPr lang="en-US" sz="3600" dirty="0"/>
           </a:p>
@@ -13017,10 +13089,9 @@
           <a:lstStyle/>
           <a:p>
             <a:r>
-              <a:rPr lang="en-US" dirty="0" smtClean="0"/>
+              <a:rPr lang="en-US" dirty="0"/>
               <a:t>State diagram (partner)</a:t>
             </a:r>
-            <a:endParaRPr lang="en-US" dirty="0"/>
           </a:p>
           <a:p>
             <a:pPr marL="0" indent="0">
@@ -13126,7 +13197,7 @@
               <a:buNone/>
               <a:tabLst/>
             </a:pPr>
-            <a:endParaRPr kumimoji="0" lang="en-US" sz="1600" b="0" i="0" u="none" strike="noStrike" cap="none" normalizeH="0" baseline="0" smtClean="0">
+            <a:endParaRPr kumimoji="0" lang="en-US" sz="1600" b="0" i="0" u="none" strike="noStrike" cap="none" normalizeH="0" baseline="0">
               <a:ln>
                 <a:noFill/>
               </a:ln>
@@ -13164,16 +13235,15 @@
           <a:lstStyle/>
           <a:p>
             <a:r>
-              <a:rPr lang="en-US" dirty="0" smtClean="0"/>
+              <a:rPr lang="en-US" dirty="0"/>
               <a:t>Home</a:t>
             </a:r>
           </a:p>
           <a:p>
             <a:r>
-              <a:rPr lang="en-US" dirty="0" smtClean="0"/>
+              <a:rPr lang="en-US" dirty="0"/>
               <a:t>(product listing)</a:t>
             </a:r>
-            <a:endParaRPr lang="en-US" dirty="0"/>
           </a:p>
         </p:txBody>
       </p:sp>
@@ -13200,18 +13270,13 @@
           <a:lstStyle/>
           <a:p>
             <a:r>
-              <a:rPr lang="en-US" dirty="0" smtClean="0">
+              <a:rPr lang="en-US" dirty="0">
                 <a:solidFill>
                   <a:srgbClr val="FF0000"/>
                 </a:solidFill>
               </a:rPr>
               <a:t>Add product</a:t>
             </a:r>
-            <a:endParaRPr lang="en-US" dirty="0">
-              <a:solidFill>
-                <a:srgbClr val="FF0000"/>
-              </a:solidFill>
-            </a:endParaRPr>
           </a:p>
         </p:txBody>
       </p:sp>
@@ -13238,10 +13303,9 @@
           <a:lstStyle/>
           <a:p>
             <a:r>
-              <a:rPr lang="en-US" dirty="0" smtClean="0"/>
+              <a:rPr lang="en-US" dirty="0"/>
               <a:t>Search product</a:t>
             </a:r>
-            <a:endParaRPr lang="en-US" dirty="0"/>
           </a:p>
         </p:txBody>
       </p:sp>
@@ -13304,7 +13368,7 @@
               <a:buNone/>
               <a:tabLst/>
             </a:pPr>
-            <a:endParaRPr kumimoji="0" lang="en-US" sz="1600" b="0" i="0" u="none" strike="noStrike" cap="none" normalizeH="0" baseline="0" smtClean="0">
+            <a:endParaRPr kumimoji="0" lang="en-US" sz="1600" b="0" i="0" u="none" strike="noStrike" cap="none" normalizeH="0" baseline="0">
               <a:ln>
                 <a:noFill/>
               </a:ln>
@@ -13378,7 +13442,7 @@
               <a:buNone/>
               <a:tabLst/>
             </a:pPr>
-            <a:endParaRPr kumimoji="0" lang="en-US" sz="1600" b="0" i="0" u="none" strike="noStrike" cap="none" normalizeH="0" baseline="0" smtClean="0">
+            <a:endParaRPr kumimoji="0" lang="en-US" sz="1600" b="0" i="0" u="none" strike="noStrike" cap="none" normalizeH="0" baseline="0">
               <a:ln>
                 <a:noFill/>
               </a:ln>
@@ -13451,7 +13515,7 @@
               <a:buNone/>
               <a:tabLst/>
             </a:pPr>
-            <a:endParaRPr kumimoji="0" lang="en-US" sz="1600" b="0" i="0" u="none" strike="noStrike" cap="none" normalizeH="0" baseline="0" smtClean="0">
+            <a:endParaRPr kumimoji="0" lang="en-US" sz="1600" b="0" i="0" u="none" strike="noStrike" cap="none" normalizeH="0" baseline="0">
               <a:ln>
                 <a:noFill/>
               </a:ln>
@@ -13489,10 +13553,9 @@
           <a:lstStyle/>
           <a:p>
             <a:r>
-              <a:rPr lang="en-US" dirty="0" smtClean="0"/>
+              <a:rPr lang="en-US" dirty="0"/>
               <a:t>Check orders</a:t>
             </a:r>
-            <a:endParaRPr lang="en-US" dirty="0"/>
           </a:p>
         </p:txBody>
       </p:sp>
@@ -13549,7 +13612,7 @@
               <a:buNone/>
               <a:tabLst/>
             </a:pPr>
-            <a:endParaRPr kumimoji="0" lang="en-US" sz="1600" b="0" i="0" u="none" strike="noStrike" cap="none" normalizeH="0" baseline="0" smtClean="0">
+            <a:endParaRPr kumimoji="0" lang="en-US" sz="1600" b="0" i="0" u="none" strike="noStrike" cap="none" normalizeH="0" baseline="0">
               <a:ln>
                 <a:noFill/>
               </a:ln>
@@ -13587,10 +13650,9 @@
           <a:lstStyle/>
           <a:p>
             <a:r>
-              <a:rPr lang="en-US" dirty="0" smtClean="0"/>
+              <a:rPr lang="en-US" dirty="0"/>
               <a:t>Order listing</a:t>
             </a:r>
-            <a:endParaRPr lang="en-US" dirty="0"/>
           </a:p>
         </p:txBody>
       </p:sp>
@@ -13617,18 +13679,13 @@
           <a:lstStyle/>
           <a:p>
             <a:r>
-              <a:rPr lang="en-US" dirty="0" smtClean="0">
+              <a:rPr lang="en-US" dirty="0">
                 <a:solidFill>
                   <a:srgbClr val="FF0000"/>
                 </a:solidFill>
               </a:rPr>
               <a:t>Ship order</a:t>
             </a:r>
-            <a:endParaRPr lang="en-US" dirty="0">
-              <a:solidFill>
-                <a:srgbClr val="FF0000"/>
-              </a:solidFill>
-            </a:endParaRPr>
           </a:p>
         </p:txBody>
       </p:sp>
@@ -13691,7 +13748,7 @@
               <a:buNone/>
               <a:tabLst/>
             </a:pPr>
-            <a:endParaRPr kumimoji="0" lang="en-US" sz="1600" b="0" i="0" u="none" strike="noStrike" cap="none" normalizeH="0" baseline="0" smtClean="0">
+            <a:endParaRPr kumimoji="0" lang="en-US" sz="1600" b="0" i="0" u="none" strike="noStrike" cap="none" normalizeH="0" baseline="0">
               <a:ln>
                 <a:noFill/>
               </a:ln>
@@ -13759,7 +13816,7 @@
               <a:buNone/>
               <a:tabLst/>
             </a:pPr>
-            <a:endParaRPr kumimoji="0" lang="en-US" sz="1600" b="0" i="0" u="none" strike="noStrike" cap="none" normalizeH="0" baseline="0" smtClean="0">
+            <a:endParaRPr kumimoji="0" lang="en-US" sz="1600" b="0" i="0" u="none" strike="noStrike" cap="none" normalizeH="0" baseline="0">
               <a:ln>
                 <a:noFill/>
               </a:ln>
@@ -13797,16 +13854,15 @@
           <a:lstStyle/>
           <a:p>
             <a:r>
-              <a:rPr lang="en-US" dirty="0" smtClean="0"/>
+              <a:rPr lang="en-US" dirty="0"/>
               <a:t>Home</a:t>
             </a:r>
           </a:p>
           <a:p>
             <a:r>
-              <a:rPr lang="en-US" dirty="0" smtClean="0"/>
+              <a:rPr lang="en-US" dirty="0"/>
               <a:t>(product listing – minimal actions enabled)</a:t>
             </a:r>
-            <a:endParaRPr lang="en-US" dirty="0"/>
           </a:p>
         </p:txBody>
       </p:sp>
@@ -13868,7 +13924,7 @@
               <a:buNone/>
               <a:tabLst/>
             </a:pPr>
-            <a:endParaRPr kumimoji="0" lang="en-US" sz="1600" b="0" i="0" u="none" strike="noStrike" cap="none" normalizeH="0" baseline="0" smtClean="0">
+            <a:endParaRPr kumimoji="0" lang="en-US" sz="1600" b="0" i="0" u="none" strike="noStrike" cap="none" normalizeH="0" baseline="0">
               <a:ln>
                 <a:noFill/>
               </a:ln>
@@ -13906,10 +13962,9 @@
           <a:lstStyle/>
           <a:p>
             <a:r>
-              <a:rPr lang="en-US" dirty="0" smtClean="0"/>
+              <a:rPr lang="en-US" dirty="0"/>
               <a:t>Log in</a:t>
             </a:r>
-            <a:endParaRPr lang="en-US" dirty="0"/>
           </a:p>
         </p:txBody>
       </p:sp>
@@ -14099,7 +14154,7 @@
               <a:buNone/>
               <a:tabLst/>
             </a:pPr>
-            <a:endParaRPr kumimoji="0" lang="en-US" sz="1600" b="0" i="0" u="none" strike="noStrike" cap="none" normalizeH="0" baseline="0" smtClean="0">
+            <a:endParaRPr kumimoji="0" lang="en-US" sz="1600" b="0" i="0" u="none" strike="noStrike" cap="none" normalizeH="0" baseline="0">
               <a:ln>
                 <a:noFill/>
               </a:ln>
@@ -14167,7 +14222,7 @@
               <a:buNone/>
               <a:tabLst/>
             </a:pPr>
-            <a:endParaRPr kumimoji="0" lang="en-US" sz="1600" b="0" i="0" u="none" strike="noStrike" cap="none" normalizeH="0" baseline="0" smtClean="0">
+            <a:endParaRPr kumimoji="0" lang="en-US" sz="1600" b="0" i="0" u="none" strike="noStrike" cap="none" normalizeH="0" baseline="0">
               <a:ln>
                 <a:noFill/>
               </a:ln>
@@ -14261,13 +14316,8 @@
             <a:pPr eaLnBrk="1" hangingPunct="1"/>
             <a:r>
               <a:rPr lang="en-US" sz="3600" dirty="0"/>
-              <a:t>Project </a:t>
-            </a:r>
-            <a:r>
-              <a:rPr lang="en-US" sz="3600" dirty="0" smtClean="0"/>
-              <a:t>Architecture</a:t>
-            </a:r>
-            <a:endParaRPr lang="en-US" sz="3600" dirty="0"/>
+              <a:t>Project Architecture</a:t>
+            </a:r>
           </a:p>
         </p:txBody>
       </p:sp>
@@ -14402,13 +14452,8 @@
           <a:p>
             <a:r>
               <a:rPr lang="en-US" sz="3600" dirty="0"/>
-              <a:t>Project </a:t>
-            </a:r>
-            <a:r>
-              <a:rPr lang="en-US" sz="3600" dirty="0" smtClean="0"/>
-              <a:t>Architecture</a:t>
-            </a:r>
-            <a:endParaRPr lang="en-US" sz="3600" dirty="0"/>
+              <a:t>Project Architecture</a:t>
+            </a:r>
           </a:p>
         </p:txBody>
       </p:sp>
@@ -14546,13 +14591,8 @@
             <a:pPr eaLnBrk="1" hangingPunct="1"/>
             <a:r>
               <a:rPr lang="en-US" sz="3600" dirty="0"/>
-              <a:t>Project </a:t>
-            </a:r>
-            <a:r>
-              <a:rPr lang="en-US" sz="3600" dirty="0" smtClean="0"/>
-              <a:t>Architecture</a:t>
-            </a:r>
-            <a:endParaRPr lang="en-US" sz="3600" dirty="0"/>
+              <a:t>Project Architecture</a:t>
+            </a:r>
           </a:p>
         </p:txBody>
       </p:sp>
@@ -14658,7 +14698,7 @@
   <p:timing>
     <p:tnLst>
       <p:par>
-        <p:cTn xmlns:p14="http://schemas.microsoft.com/office/powerpoint/2010/main" id="1" dur="indefinite" restart="never" nodeType="tmRoot">
+        <p:cTn id="1" dur="indefinite" restart="never" nodeType="tmRoot">
           <p:childTnLst>
             <p:seq concurrent="1" nextAc="seek">
               <p:cTn id="2" dur="indefinite" nodeType="mainSeq">

</xml_diff>

<commit_message>
Added ship order link, modified ppt
</commit_message>
<xml_diff>
--- a/comp433p2p3/COMP433FinalPPT.pptx
+++ b/comp433p2p3/COMP433FinalPPT.pptx
@@ -14396,7 +14396,7 @@
         <p:spPr>
           <a:xfrm>
             <a:off x="5435600" y="3403600"/>
-            <a:ext cx="1279617" cy="338554"/>
+            <a:ext cx="2210305" cy="584776"/>
           </a:xfrm>
           <a:prstGeom prst="rect">
             <a:avLst/>
@@ -14404,7 +14404,7 @@
           <a:noFill/>
         </p:spPr>
         <p:txBody>
-          <a:bodyPr wrap="none" rtlCol="0">
+          <a:bodyPr wrap="square" rtlCol="0">
             <a:spAutoFit/>
           </a:bodyPr>
           <a:lstStyle/>
@@ -14415,8 +14415,21 @@
                   <a:srgbClr val="FF0000"/>
                 </a:solidFill>
               </a:rPr>
-              <a:t>Buy product</a:t>
-            </a:r>
+              <a:t>Buy </a:t>
+            </a:r>
+            <a:r>
+              <a:rPr lang="en-US" dirty="0" smtClean="0">
+                <a:solidFill>
+                  <a:srgbClr val="FF0000"/>
+                </a:solidFill>
+              </a:rPr>
+              <a:t>product (hypermedia link)</a:t>
+            </a:r>
+            <a:endParaRPr lang="en-US" dirty="0">
+              <a:solidFill>
+                <a:srgbClr val="FF0000"/>
+              </a:solidFill>
+            </a:endParaRPr>
           </a:p>
         </p:txBody>
       </p:sp>
@@ -14804,8 +14817,8 @@
         </p:nvSpPr>
         <p:spPr>
           <a:xfrm>
-            <a:off x="7607300" y="5334000"/>
-            <a:ext cx="1359367" cy="338554"/>
+            <a:off x="7385686" y="5334000"/>
+            <a:ext cx="1758314" cy="646331"/>
           </a:xfrm>
           <a:prstGeom prst="rect">
             <a:avLst/>
@@ -14824,8 +14837,31 @@
                   <a:srgbClr val="FF0000"/>
                 </a:solidFill>
               </a:rPr>
-              <a:t>Cancel order</a:t>
-            </a:r>
+              <a:t>Cancel </a:t>
+            </a:r>
+            <a:r>
+              <a:rPr lang="en-US" dirty="0" smtClean="0">
+                <a:solidFill>
+                  <a:srgbClr val="FF0000"/>
+                </a:solidFill>
+              </a:rPr>
+              <a:t>order</a:t>
+            </a:r>
+          </a:p>
+          <a:p>
+            <a:r>
+              <a:rPr lang="en-US" dirty="0" smtClean="0">
+                <a:solidFill>
+                  <a:srgbClr val="FF0000"/>
+                </a:solidFill>
+              </a:rPr>
+              <a:t>(hypermedia link)</a:t>
+            </a:r>
+            <a:endParaRPr lang="en-US" dirty="0">
+              <a:solidFill>
+                <a:srgbClr val="FF0000"/>
+              </a:solidFill>
+            </a:endParaRPr>
           </a:p>
         </p:txBody>
       </p:sp>
@@ -15756,8 +15792,8 @@
         </p:nvSpPr>
         <p:spPr>
           <a:xfrm>
-            <a:off x="7607300" y="5334000"/>
-            <a:ext cx="1131339" cy="338554"/>
+            <a:off x="7385686" y="5334000"/>
+            <a:ext cx="1758314" cy="646331"/>
           </a:xfrm>
           <a:prstGeom prst="rect">
             <a:avLst/>
@@ -15776,8 +15812,31 @@
                   <a:srgbClr val="FF0000"/>
                 </a:solidFill>
               </a:rPr>
-              <a:t>Ship order</a:t>
-            </a:r>
+              <a:t>Ship </a:t>
+            </a:r>
+            <a:r>
+              <a:rPr lang="en-US" dirty="0" smtClean="0">
+                <a:solidFill>
+                  <a:srgbClr val="FF0000"/>
+                </a:solidFill>
+              </a:rPr>
+              <a:t>order</a:t>
+            </a:r>
+          </a:p>
+          <a:p>
+            <a:r>
+              <a:rPr lang="en-US" dirty="0" smtClean="0">
+                <a:solidFill>
+                  <a:srgbClr val="FF0000"/>
+                </a:solidFill>
+              </a:rPr>
+              <a:t>(hypermedia link)</a:t>
+            </a:r>
+            <a:endParaRPr lang="en-US" dirty="0">
+              <a:solidFill>
+                <a:srgbClr val="FF0000"/>
+              </a:solidFill>
+            </a:endParaRPr>
           </a:p>
         </p:txBody>
       </p:sp>

</xml_diff>